<commit_message>
2023 Paper Version 7 Code Update
Many changes and additions, including addition of scatter plots 2020 Jupiter retrievals, better plots of filters for SCT and VLT including the Jovian albedo. MOST IMPORTANTLY I aligned all the computations for k_eff and calibrations with the proper filter shapes specific to SCT and VLT. SCT filters now incorporate the overall system performance, but this is done explicitly in line. I NEED TO CHECK IF IT'S DONE EVERYWHERE NEEDED. ALSO, THERE'S TONS OF HARDCODING OF KEY PARAMETERS AND REARCHITECTNIG IS NEEDED NOT TO HAVE ISSUES ACCIDENTAL ERRORS IF ITEMS NEED UPDATING AND AREN'T UPDATED EVERYWHERE.
</commit_message>
<xml_diff>
--- a/Research Documentation Organization.pptx
+++ b/Research Documentation Organization.pptx
@@ -13,6 +13,7 @@
     <p:sldId id="262" r:id="rId7"/>
     <p:sldId id="263" r:id="rId8"/>
     <p:sldId id="264" r:id="rId9"/>
+    <p:sldId id="266" r:id="rId10"/>
   </p:sldIdLst>
   <p:sldSz cx="12192000" cy="6858000"/>
   <p:notesSz cx="6858000" cy="9144000"/>
@@ -266,7 +267,7 @@
           <a:p>
             <a:fld id="{99B041D1-04ED-477D-878E-7F7DCAD0400F}" type="datetimeFigureOut">
               <a:rPr lang="en-US" smtClean="0"/>
-              <a:t>12/15/2021</a:t>
+              <a:t>6/23/2023</a:t>
             </a:fld>
             <a:endParaRPr lang="en-US"/>
           </a:p>
@@ -464,7 +465,7 @@
           <a:p>
             <a:fld id="{99B041D1-04ED-477D-878E-7F7DCAD0400F}" type="datetimeFigureOut">
               <a:rPr lang="en-US" smtClean="0"/>
-              <a:t>12/15/2021</a:t>
+              <a:t>6/23/2023</a:t>
             </a:fld>
             <a:endParaRPr lang="en-US"/>
           </a:p>
@@ -672,7 +673,7 @@
           <a:p>
             <a:fld id="{99B041D1-04ED-477D-878E-7F7DCAD0400F}" type="datetimeFigureOut">
               <a:rPr lang="en-US" smtClean="0"/>
-              <a:t>12/15/2021</a:t>
+              <a:t>6/23/2023</a:t>
             </a:fld>
             <a:endParaRPr lang="en-US"/>
           </a:p>
@@ -870,7 +871,7 @@
           <a:p>
             <a:fld id="{99B041D1-04ED-477D-878E-7F7DCAD0400F}" type="datetimeFigureOut">
               <a:rPr lang="en-US" smtClean="0"/>
-              <a:t>12/15/2021</a:t>
+              <a:t>6/23/2023</a:t>
             </a:fld>
             <a:endParaRPr lang="en-US"/>
           </a:p>
@@ -1145,7 +1146,7 @@
           <a:p>
             <a:fld id="{99B041D1-04ED-477D-878E-7F7DCAD0400F}" type="datetimeFigureOut">
               <a:rPr lang="en-US" smtClean="0"/>
-              <a:t>12/15/2021</a:t>
+              <a:t>6/23/2023</a:t>
             </a:fld>
             <a:endParaRPr lang="en-US"/>
           </a:p>
@@ -1410,7 +1411,7 @@
           <a:p>
             <a:fld id="{99B041D1-04ED-477D-878E-7F7DCAD0400F}" type="datetimeFigureOut">
               <a:rPr lang="en-US" smtClean="0"/>
-              <a:t>12/15/2021</a:t>
+              <a:t>6/23/2023</a:t>
             </a:fld>
             <a:endParaRPr lang="en-US"/>
           </a:p>
@@ -1822,7 +1823,7 @@
           <a:p>
             <a:fld id="{99B041D1-04ED-477D-878E-7F7DCAD0400F}" type="datetimeFigureOut">
               <a:rPr lang="en-US" smtClean="0"/>
-              <a:t>12/15/2021</a:t>
+              <a:t>6/23/2023</a:t>
             </a:fld>
             <a:endParaRPr lang="en-US"/>
           </a:p>
@@ -1963,7 +1964,7 @@
           <a:p>
             <a:fld id="{99B041D1-04ED-477D-878E-7F7DCAD0400F}" type="datetimeFigureOut">
               <a:rPr lang="en-US" smtClean="0"/>
-              <a:t>12/15/2021</a:t>
+              <a:t>6/23/2023</a:t>
             </a:fld>
             <a:endParaRPr lang="en-US"/>
           </a:p>
@@ -2076,7 +2077,7 @@
           <a:p>
             <a:fld id="{99B041D1-04ED-477D-878E-7F7DCAD0400F}" type="datetimeFigureOut">
               <a:rPr lang="en-US" smtClean="0"/>
-              <a:t>12/15/2021</a:t>
+              <a:t>6/23/2023</a:t>
             </a:fld>
             <a:endParaRPr lang="en-US"/>
           </a:p>
@@ -2387,7 +2388,7 @@
           <a:p>
             <a:fld id="{99B041D1-04ED-477D-878E-7F7DCAD0400F}" type="datetimeFigureOut">
               <a:rPr lang="en-US" smtClean="0"/>
-              <a:t>12/15/2021</a:t>
+              <a:t>6/23/2023</a:t>
             </a:fld>
             <a:endParaRPr lang="en-US"/>
           </a:p>
@@ -2675,7 +2676,7 @@
           <a:p>
             <a:fld id="{99B041D1-04ED-477D-878E-7F7DCAD0400F}" type="datetimeFigureOut">
               <a:rPr lang="en-US" smtClean="0"/>
-              <a:t>12/15/2021</a:t>
+              <a:t>6/23/2023</a:t>
             </a:fld>
             <a:endParaRPr lang="en-US"/>
           </a:p>
@@ -2916,7 +2917,7 @@
           <a:p>
             <a:fld id="{99B041D1-04ED-477D-878E-7F7DCAD0400F}" type="datetimeFigureOut">
               <a:rPr lang="en-US" smtClean="0"/>
-              <a:t>12/15/2021</a:t>
+              <a:t>6/23/2023</a:t>
             </a:fld>
             <a:endParaRPr lang="en-US"/>
           </a:p>
@@ -16289,6 +16290,165 @@
 </p:sld>
 </file>
 
+<file path=ppt/slides/slide9.xml><?xml version="1.0" encoding="utf-8"?>
+<p:sld xmlns:a="http://schemas.openxmlformats.org/drawingml/2006/main" xmlns:r="http://schemas.openxmlformats.org/officeDocument/2006/relationships" xmlns:p="http://schemas.openxmlformats.org/presentationml/2006/main">
+  <p:cSld>
+    <p:spTree>
+      <p:nvGrpSpPr>
+        <p:cNvPr id="1" name=""/>
+        <p:cNvGrpSpPr/>
+        <p:nvPr/>
+      </p:nvGrpSpPr>
+      <p:grpSpPr>
+        <a:xfrm>
+          <a:off x="0" y="0"/>
+          <a:ext cx="0" cy="0"/>
+          <a:chOff x="0" y="0"/>
+          <a:chExt cx="0" cy="0"/>
+        </a:xfrm>
+      </p:grpSpPr>
+      <p:sp>
+        <p:nvSpPr>
+          <p:cNvPr id="2" name="Title 1">
+            <a:extLst>
+              <a:ext uri="{FF2B5EF4-FFF2-40B4-BE49-F238E27FC236}">
+                <a16:creationId xmlns:a16="http://schemas.microsoft.com/office/drawing/2014/main" id="{4C2E6148-FA9A-4F00-0E87-FEFFF29E53A8}"/>
+              </a:ext>
+            </a:extLst>
+          </p:cNvPr>
+          <p:cNvSpPr>
+            <a:spLocks noGrp="1"/>
+          </p:cNvSpPr>
+          <p:nvPr>
+            <p:ph type="title"/>
+          </p:nvPr>
+        </p:nvSpPr>
+        <p:spPr/>
+        <p:txBody>
+          <a:bodyPr/>
+          <a:lstStyle/>
+          <a:p>
+            <a:endParaRPr lang="en-US"/>
+          </a:p>
+        </p:txBody>
+      </p:sp>
+      <p:pic>
+        <p:nvPicPr>
+          <p:cNvPr id="4" name="Picture 3" descr="A picture containing outdoor, day&#10;&#10;Description automatically generated">
+            <a:extLst>
+              <a:ext uri="{FF2B5EF4-FFF2-40B4-BE49-F238E27FC236}">
+                <a16:creationId xmlns:a16="http://schemas.microsoft.com/office/drawing/2014/main" id="{49FFC90D-8B58-C2FB-1504-785848E56DC9}"/>
+              </a:ext>
+            </a:extLst>
+          </p:cNvPr>
+          <p:cNvPicPr>
+            <a:picLocks noChangeAspect="1"/>
+          </p:cNvPicPr>
+          <p:nvPr/>
+        </p:nvPicPr>
+        <p:blipFill>
+          <a:blip r:embed="rId2">
+            <a:clrChange>
+              <a:clrFrom>
+                <a:srgbClr val="FFFFFF"/>
+              </a:clrFrom>
+              <a:clrTo>
+                <a:srgbClr val="FFFFFF">
+                  <a:alpha val="0"/>
+                </a:srgbClr>
+              </a:clrTo>
+            </a:clrChange>
+            <a:extLst>
+              <a:ext uri="{28A0092B-C50C-407E-A947-70E740481C1C}">
+                <a14:useLocalDpi xmlns:a14="http://schemas.microsoft.com/office/drawing/2010/main" val="0"/>
+              </a:ext>
+            </a:extLst>
+          </a:blip>
+          <a:stretch>
+            <a:fillRect/>
+          </a:stretch>
+        </p:blipFill>
+        <p:spPr>
+          <a:xfrm>
+            <a:off x="0" y="0"/>
+            <a:ext cx="12192000" cy="6858000"/>
+          </a:xfrm>
+          <a:prstGeom prst="rect">
+            <a:avLst/>
+          </a:prstGeom>
+        </p:spPr>
+      </p:pic>
+      <p:pic>
+        <p:nvPicPr>
+          <p:cNvPr id="1028" name="Picture 4" descr="Battery Charge Vector Art, Icons, and Graphics for Free Download">
+            <a:extLst>
+              <a:ext uri="{FF2B5EF4-FFF2-40B4-BE49-F238E27FC236}">
+                <a16:creationId xmlns:a16="http://schemas.microsoft.com/office/drawing/2014/main" id="{C504AFF3-C3F5-7594-5569-0E3B9836CB9D}"/>
+              </a:ext>
+            </a:extLst>
+          </p:cNvPr>
+          <p:cNvPicPr>
+            <a:picLocks noChangeAspect="1" noChangeArrowheads="1"/>
+          </p:cNvPicPr>
+          <p:nvPr/>
+        </p:nvPicPr>
+        <p:blipFill>
+          <a:blip r:embed="rId3">
+            <a:clrChange>
+              <a:clrFrom>
+                <a:srgbClr val="FFFFFF"/>
+              </a:clrFrom>
+              <a:clrTo>
+                <a:srgbClr val="FFFFFF">
+                  <a:alpha val="0"/>
+                </a:srgbClr>
+              </a:clrTo>
+            </a:clrChange>
+            <a:lum bright="70000" contrast="-70000"/>
+            <a:extLst>
+              <a:ext uri="{28A0092B-C50C-407E-A947-70E740481C1C}">
+                <a14:useLocalDpi xmlns:a14="http://schemas.microsoft.com/office/drawing/2010/main" val="0"/>
+              </a:ext>
+            </a:extLst>
+          </a:blip>
+          <a:srcRect/>
+          <a:stretch>
+            <a:fillRect/>
+          </a:stretch>
+        </p:blipFill>
+        <p:spPr bwMode="auto">
+          <a:xfrm>
+            <a:off x="10356112" y="-121629"/>
+            <a:ext cx="1680221" cy="1680221"/>
+          </a:xfrm>
+          <a:prstGeom prst="rect">
+            <a:avLst/>
+          </a:prstGeom>
+          <a:noFill/>
+          <a:extLst>
+            <a:ext uri="{909E8E84-426E-40DD-AFC4-6F175D3DCCD1}">
+              <a14:hiddenFill xmlns:a14="http://schemas.microsoft.com/office/drawing/2010/main">
+                <a:solidFill>
+                  <a:srgbClr val="FFFFFF"/>
+                </a:solidFill>
+              </a14:hiddenFill>
+            </a:ext>
+          </a:extLst>
+        </p:spPr>
+      </p:pic>
+    </p:spTree>
+    <p:extLst>
+      <p:ext uri="{BB962C8B-B14F-4D97-AF65-F5344CB8AC3E}">
+        <p14:creationId xmlns:p14="http://schemas.microsoft.com/office/powerpoint/2010/main" val="3704928806"/>
+      </p:ext>
+    </p:extLst>
+  </p:cSld>
+  <p:clrMapOvr>
+    <a:masterClrMapping/>
+  </p:clrMapOvr>
+</p:sld>
+</file>
+
 <file path=ppt/theme/theme1.xml><?xml version="1.0" encoding="utf-8"?>
 <a:theme xmlns:a="http://schemas.openxmlformats.org/drawingml/2006/main" name="Office Theme">
   <a:themeElements>

</xml_diff>